<commit_message>
Edited presentation, and added a radio menu for color selection. Also attempted to try and make it so that colors could change (no such luck though).
</commit_message>
<xml_diff>
--- a/SE 2811-031 Section 031.pptx
+++ b/SE 2811-031 Section 031.pptx
@@ -5,34 +5,35 @@
     <p:sldMasterId id="2147483659" r:id="rId1"/>
   </p:sldMasterIdLst>
   <p:notesMasterIdLst>
-    <p:notesMasterId r:id="rId10"/>
+    <p:notesMasterId r:id="rId11"/>
   </p:notesMasterIdLst>
   <p:sldIdLst>
     <p:sldId id="256" r:id="rId2"/>
     <p:sldId id="257" r:id="rId3"/>
     <p:sldId id="258" r:id="rId4"/>
     <p:sldId id="259" r:id="rId5"/>
-    <p:sldId id="260" r:id="rId6"/>
-    <p:sldId id="261" r:id="rId7"/>
-    <p:sldId id="262" r:id="rId8"/>
-    <p:sldId id="263" r:id="rId9"/>
+    <p:sldId id="264" r:id="rId6"/>
+    <p:sldId id="260" r:id="rId7"/>
+    <p:sldId id="261" r:id="rId8"/>
+    <p:sldId id="262" r:id="rId9"/>
+    <p:sldId id="263" r:id="rId10"/>
   </p:sldIdLst>
   <p:sldSz cx="9144000" cy="5143500" type="screen16x9"/>
   <p:notesSz cx="6858000" cy="9144000"/>
   <p:embeddedFontLst>
     <p:embeddedFont>
       <p:font typeface="Economica" panose="020B0604020202020204" charset="0"/>
-      <p:regular r:id="rId11"/>
-      <p:bold r:id="rId12"/>
-      <p:italic r:id="rId13"/>
-      <p:boldItalic r:id="rId14"/>
+      <p:regular r:id="rId12"/>
+      <p:bold r:id="rId13"/>
+      <p:italic r:id="rId14"/>
+      <p:boldItalic r:id="rId15"/>
     </p:embeddedFont>
     <p:embeddedFont>
       <p:font typeface="Open Sans" panose="020B0606030504020204" pitchFamily="34" charset="0"/>
-      <p:regular r:id="rId15"/>
-      <p:bold r:id="rId16"/>
-      <p:italic r:id="rId17"/>
-      <p:boldItalic r:id="rId18"/>
+      <p:regular r:id="rId16"/>
+      <p:bold r:id="rId17"/>
+      <p:italic r:id="rId18"/>
+      <p:boldItalic r:id="rId19"/>
     </p:embeddedFont>
   </p:embeddedFontLst>
   <p:defaultTextStyle>
@@ -8276,6 +8277,110 @@
   <p:cSld>
     <p:spTree>
       <p:nvGrpSpPr>
+        <p:cNvPr id="1" name=""/>
+        <p:cNvGrpSpPr/>
+        <p:nvPr/>
+      </p:nvGrpSpPr>
+      <p:grpSpPr>
+        <a:xfrm>
+          <a:off x="0" y="0"/>
+          <a:ext cx="0" cy="0"/>
+          <a:chOff x="0" y="0"/>
+          <a:chExt cx="0" cy="0"/>
+        </a:xfrm>
+      </p:grpSpPr>
+      <p:sp>
+        <p:nvSpPr>
+          <p:cNvPr id="2" name="Title 1">
+            <a:extLst>
+              <a:ext uri="{FF2B5EF4-FFF2-40B4-BE49-F238E27FC236}">
+                <a16:creationId xmlns:a16="http://schemas.microsoft.com/office/drawing/2014/main" id="{6D5BEA28-66E1-41F3-AE69-8052D4177C16}"/>
+              </a:ext>
+            </a:extLst>
+          </p:cNvPr>
+          <p:cNvSpPr>
+            <a:spLocks noGrp="1"/>
+          </p:cNvSpPr>
+          <p:nvPr>
+            <p:ph type="title"/>
+          </p:nvPr>
+        </p:nvSpPr>
+        <p:spPr/>
+        <p:txBody>
+          <a:bodyPr/>
+          <a:lstStyle/>
+          <a:p>
+            <a:pPr algn="ctr"/>
+            <a:r>
+              <a:rPr lang="en-US" dirty="0"/>
+              <a:t>Why use the pattern over a list of states?</a:t>
+            </a:r>
+          </a:p>
+        </p:txBody>
+      </p:sp>
+      <p:sp>
+        <p:nvSpPr>
+          <p:cNvPr id="3" name="Text Placeholder 2">
+            <a:extLst>
+              <a:ext uri="{FF2B5EF4-FFF2-40B4-BE49-F238E27FC236}">
+                <a16:creationId xmlns:a16="http://schemas.microsoft.com/office/drawing/2014/main" id="{C7357571-1667-47F8-AA62-9C06833607CD}"/>
+              </a:ext>
+            </a:extLst>
+          </p:cNvPr>
+          <p:cNvSpPr>
+            <a:spLocks noGrp="1"/>
+          </p:cNvSpPr>
+          <p:nvPr>
+            <p:ph type="body" idx="1"/>
+          </p:nvPr>
+        </p:nvSpPr>
+        <p:spPr/>
+        <p:txBody>
+          <a:bodyPr/>
+          <a:lstStyle/>
+          <a:p>
+            <a:r>
+              <a:rPr lang="en-US" dirty="0"/>
+              <a:t>You don’t have direct access to the states in a simple list.</a:t>
+            </a:r>
+          </a:p>
+          <a:p>
+            <a:r>
+              <a:rPr lang="en-US" dirty="0"/>
+              <a:t>You miss the ability to interact with the specific save states.</a:t>
+            </a:r>
+          </a:p>
+          <a:p>
+            <a:r>
+              <a:rPr lang="en-US" dirty="0"/>
+              <a:t>Having the memento patterns allows for branching paths via </a:t>
+            </a:r>
+            <a:r>
+              <a:rPr lang="en-US"/>
+              <a:t>save states.</a:t>
+            </a:r>
+            <a:endParaRPr lang="en-US" dirty="0"/>
+          </a:p>
+        </p:txBody>
+      </p:sp>
+    </p:spTree>
+    <p:extLst>
+      <p:ext uri="{BB962C8B-B14F-4D97-AF65-F5344CB8AC3E}">
+        <p14:creationId xmlns:p14="http://schemas.microsoft.com/office/powerpoint/2010/main" val="2873770419"/>
+      </p:ext>
+    </p:extLst>
+  </p:cSld>
+  <p:clrMapOvr>
+    <a:masterClrMapping/>
+  </p:clrMapOvr>
+</p:sld>
+</file>
+
+<file path=ppt/slides/slide6.xml><?xml version="1.0" encoding="utf-8"?>
+<p:sld xmlns:a="http://schemas.openxmlformats.org/drawingml/2006/main" xmlns:r="http://schemas.openxmlformats.org/officeDocument/2006/relationships" xmlns:p="http://schemas.openxmlformats.org/presentationml/2006/main">
+  <p:cSld>
+    <p:spTree>
+      <p:nvGrpSpPr>
         <p:cNvPr id="1" name="Shape 88"/>
         <p:cNvGrpSpPr/>
         <p:nvPr/>
@@ -8366,7 +8471,7 @@
 </p:sld>
 </file>
 
-<file path=ppt/slides/slide6.xml><?xml version="1.0" encoding="utf-8"?>
+<file path=ppt/slides/slide7.xml><?xml version="1.0" encoding="utf-8"?>
 <p:sld xmlns:a="http://schemas.openxmlformats.org/drawingml/2006/main" xmlns:r="http://schemas.openxmlformats.org/officeDocument/2006/relationships" xmlns:p="http://schemas.openxmlformats.org/presentationml/2006/main">
   <p:cSld>
     <p:spTree>
@@ -8475,7 +8580,7 @@
 </p:sld>
 </file>
 
-<file path=ppt/slides/slide7.xml><?xml version="1.0" encoding="utf-8"?>
+<file path=ppt/slides/slide8.xml><?xml version="1.0" encoding="utf-8"?>
 <p:sld xmlns:a="http://schemas.openxmlformats.org/drawingml/2006/main" xmlns:r="http://schemas.openxmlformats.org/officeDocument/2006/relationships" xmlns:p="http://schemas.openxmlformats.org/presentationml/2006/main">
   <p:cSld>
     <p:spTree>
@@ -8760,7 +8865,7 @@
 </p:sld>
 </file>
 
-<file path=ppt/slides/slide8.xml><?xml version="1.0" encoding="utf-8"?>
+<file path=ppt/slides/slide9.xml><?xml version="1.0" encoding="utf-8"?>
 <p:sld xmlns:a="http://schemas.openxmlformats.org/drawingml/2006/main" xmlns:r="http://schemas.openxmlformats.org/officeDocument/2006/relationships" xmlns:p="http://schemas.openxmlformats.org/presentationml/2006/main">
   <p:cSld>
     <p:spTree>

</xml_diff>

<commit_message>
Updated presentation and rearranged some details.
</commit_message>
<xml_diff>
--- a/SE 2811-031 Section 031.pptx
+++ b/SE 2811-031 Section 031.pptx
@@ -5,35 +5,37 @@
     <p:sldMasterId id="2147483659" r:id="rId1"/>
   </p:sldMasterIdLst>
   <p:notesMasterIdLst>
-    <p:notesMasterId r:id="rId11"/>
+    <p:notesMasterId r:id="rId13"/>
   </p:notesMasterIdLst>
   <p:sldIdLst>
     <p:sldId id="256" r:id="rId2"/>
     <p:sldId id="257" r:id="rId3"/>
-    <p:sldId id="258" r:id="rId4"/>
-    <p:sldId id="259" r:id="rId5"/>
-    <p:sldId id="264" r:id="rId6"/>
-    <p:sldId id="260" r:id="rId7"/>
-    <p:sldId id="261" r:id="rId8"/>
-    <p:sldId id="262" r:id="rId9"/>
-    <p:sldId id="263" r:id="rId10"/>
+    <p:sldId id="266" r:id="rId4"/>
+    <p:sldId id="258" r:id="rId5"/>
+    <p:sldId id="259" r:id="rId6"/>
+    <p:sldId id="264" r:id="rId7"/>
+    <p:sldId id="260" r:id="rId8"/>
+    <p:sldId id="261" r:id="rId9"/>
+    <p:sldId id="262" r:id="rId10"/>
+    <p:sldId id="263" r:id="rId11"/>
+    <p:sldId id="265" r:id="rId12"/>
   </p:sldIdLst>
   <p:sldSz cx="9144000" cy="5143500" type="screen16x9"/>
   <p:notesSz cx="6858000" cy="9144000"/>
   <p:embeddedFontLst>
     <p:embeddedFont>
       <p:font typeface="Economica" panose="020B0604020202020204" charset="0"/>
-      <p:regular r:id="rId12"/>
-      <p:bold r:id="rId13"/>
-      <p:italic r:id="rId14"/>
-      <p:boldItalic r:id="rId15"/>
+      <p:regular r:id="rId14"/>
+      <p:bold r:id="rId15"/>
+      <p:italic r:id="rId16"/>
+      <p:boldItalic r:id="rId17"/>
     </p:embeddedFont>
     <p:embeddedFont>
       <p:font typeface="Open Sans" panose="020B0606030504020204" pitchFamily="34" charset="0"/>
-      <p:regular r:id="rId16"/>
-      <p:bold r:id="rId17"/>
-      <p:italic r:id="rId18"/>
-      <p:boldItalic r:id="rId19"/>
+      <p:regular r:id="rId18"/>
+      <p:bold r:id="rId19"/>
+      <p:italic r:id="rId20"/>
+      <p:boldItalic r:id="rId21"/>
     </p:embeddedFont>
   </p:embeddedFontLst>
   <p:defaultTextStyle>
@@ -754,8 +756,8 @@
         </p:nvSpPr>
         <p:spPr>
           <a:xfrm>
-            <a:off x="381300" y="685800"/>
-            <a:ext cx="6096075" cy="3429000"/>
+            <a:off x="381000" y="685800"/>
+            <a:ext cx="6096000" cy="3429000"/>
           </a:xfrm>
           <a:custGeom>
             <a:avLst/>
@@ -911,7 +913,7 @@
         </p:nvSpPr>
         <p:spPr>
           <a:xfrm>
-            <a:off x="381300" y="685800"/>
+            <a:off x="381000" y="685800"/>
             <a:ext cx="6096000" cy="3429000"/>
           </a:xfrm>
           <a:custGeom>
@@ -1261,7 +1263,7 @@
         </p:nvSpPr>
         <p:spPr>
           <a:xfrm>
-            <a:off x="381300" y="685800"/>
+            <a:off x="381000" y="685800"/>
             <a:ext cx="6096000" cy="3429000"/>
           </a:xfrm>
           <a:custGeom>
@@ -1369,7 +1371,7 @@
         </p:nvSpPr>
         <p:spPr>
           <a:xfrm>
-            <a:off x="381300" y="685800"/>
+            <a:off x="381000" y="685800"/>
             <a:ext cx="6096000" cy="3429000"/>
           </a:xfrm>
           <a:custGeom>
@@ -1585,7 +1587,7 @@
         </p:nvSpPr>
         <p:spPr>
           <a:xfrm>
-            <a:off x="381300" y="685800"/>
+            <a:off x="381000" y="685800"/>
             <a:ext cx="6096000" cy="3429000"/>
           </a:xfrm>
           <a:custGeom>
@@ -7516,7 +7518,7 @@
         </p:spPr>
         <p:txBody>
           <a:bodyPr spcFirstLastPara="1" wrap="square" lIns="91425" tIns="91425" rIns="91425" bIns="91425" anchor="t" anchorCtr="0">
-            <a:normAutofit lnSpcReduction="20000"/>
+            <a:normAutofit fontScale="92500"/>
           </a:bodyPr>
           <a:lstStyle/>
           <a:p>
@@ -7566,6 +7568,267 @@
         </p:spPr>
       </p:pic>
     </p:spTree>
+  </p:cSld>
+  <p:clrMapOvr>
+    <a:masterClrMapping/>
+  </p:clrMapOvr>
+</p:sld>
+</file>
+
+<file path=ppt/slides/slide10.xml><?xml version="1.0" encoding="utf-8"?>
+<p:sld xmlns:a="http://schemas.openxmlformats.org/drawingml/2006/main" xmlns:r="http://schemas.openxmlformats.org/officeDocument/2006/relationships" xmlns:p="http://schemas.openxmlformats.org/presentationml/2006/main">
+  <p:cSld>
+    <p:spTree>
+      <p:nvGrpSpPr>
+        <p:cNvPr id="1" name="Shape 107"/>
+        <p:cNvGrpSpPr/>
+        <p:nvPr/>
+      </p:nvGrpSpPr>
+      <p:grpSpPr>
+        <a:xfrm>
+          <a:off x="0" y="0"/>
+          <a:ext cx="0" cy="0"/>
+          <a:chOff x="0" y="0"/>
+          <a:chExt cx="0" cy="0"/>
+        </a:xfrm>
+      </p:grpSpPr>
+      <p:sp>
+        <p:nvSpPr>
+          <p:cNvPr id="108" name="Google Shape;108;p20"/>
+          <p:cNvSpPr txBox="1">
+            <a:spLocks noGrp="1"/>
+          </p:cNvSpPr>
+          <p:nvPr>
+            <p:ph type="title"/>
+          </p:nvPr>
+        </p:nvSpPr>
+        <p:spPr>
+          <a:xfrm>
+            <a:off x="311700" y="315925"/>
+            <a:ext cx="8520600" cy="831300"/>
+          </a:xfrm>
+          <a:prstGeom prst="rect">
+            <a:avLst/>
+          </a:prstGeom>
+        </p:spPr>
+        <p:txBody>
+          <a:bodyPr spcFirstLastPara="1" wrap="square" lIns="91425" tIns="91425" rIns="91425" bIns="91425" anchor="b" anchorCtr="0">
+            <a:normAutofit/>
+          </a:bodyPr>
+          <a:lstStyle/>
+          <a:p>
+            <a:pPr marL="0" lvl="0" indent="0" algn="ctr" rtl="0">
+              <a:spcBef>
+                <a:spcPts val="0"/>
+              </a:spcBef>
+              <a:spcAft>
+                <a:spcPts val="0"/>
+              </a:spcAft>
+              <a:buNone/>
+            </a:pPr>
+            <a:r>
+              <a:rPr lang="en" u="sng"/>
+              <a:t>Memento pattern conclusion (and summary):</a:t>
+            </a:r>
+            <a:endParaRPr u="sng"/>
+          </a:p>
+        </p:txBody>
+      </p:sp>
+      <p:sp>
+        <p:nvSpPr>
+          <p:cNvPr id="109" name="Google Shape;109;p20"/>
+          <p:cNvSpPr txBox="1">
+            <a:spLocks noGrp="1"/>
+          </p:cNvSpPr>
+          <p:nvPr>
+            <p:ph type="body" idx="1"/>
+          </p:nvPr>
+        </p:nvSpPr>
+        <p:spPr>
+          <a:xfrm>
+            <a:off x="311700" y="1225225"/>
+            <a:ext cx="8520600" cy="3354000"/>
+          </a:xfrm>
+          <a:prstGeom prst="rect">
+            <a:avLst/>
+          </a:prstGeom>
+        </p:spPr>
+        <p:txBody>
+          <a:bodyPr spcFirstLastPara="1" wrap="square" lIns="91425" tIns="91425" rIns="91425" bIns="91425" anchor="t" anchorCtr="0">
+            <a:normAutofit/>
+          </a:bodyPr>
+          <a:lstStyle/>
+          <a:p>
+            <a:pPr marL="457200" lvl="0" indent="-342900" algn="l" rtl="0">
+              <a:spcBef>
+                <a:spcPts val="0"/>
+              </a:spcBef>
+              <a:spcAft>
+                <a:spcPts val="0"/>
+              </a:spcAft>
+              <a:buSzPts val="1800"/>
+              <a:buChar char="●"/>
+            </a:pPr>
+            <a:r>
+              <a:rPr lang="en"/>
+              <a:t>You can use the memento pattern to save and restore various states of an object</a:t>
+            </a:r>
+            <a:endParaRPr/>
+          </a:p>
+          <a:p>
+            <a:pPr marL="457200" lvl="0" indent="-342900" algn="l" rtl="0">
+              <a:spcBef>
+                <a:spcPts val="0"/>
+              </a:spcBef>
+              <a:spcAft>
+                <a:spcPts val="0"/>
+              </a:spcAft>
+              <a:buSzPts val="1800"/>
+              <a:buChar char="●"/>
+            </a:pPr>
+            <a:r>
+              <a:rPr lang="en"/>
+              <a:t>The basis of rolling back states</a:t>
+            </a:r>
+            <a:endParaRPr/>
+          </a:p>
+        </p:txBody>
+      </p:sp>
+    </p:spTree>
+  </p:cSld>
+  <p:clrMapOvr>
+    <a:masterClrMapping/>
+  </p:clrMapOvr>
+</p:sld>
+</file>
+
+<file path=ppt/slides/slide11.xml><?xml version="1.0" encoding="utf-8"?>
+<p:sld xmlns:a="http://schemas.openxmlformats.org/drawingml/2006/main" xmlns:r="http://schemas.openxmlformats.org/officeDocument/2006/relationships" xmlns:p="http://schemas.openxmlformats.org/presentationml/2006/main">
+  <p:cSld>
+    <p:spTree>
+      <p:nvGrpSpPr>
+        <p:cNvPr id="1" name=""/>
+        <p:cNvGrpSpPr/>
+        <p:nvPr/>
+      </p:nvGrpSpPr>
+      <p:grpSpPr>
+        <a:xfrm>
+          <a:off x="0" y="0"/>
+          <a:ext cx="0" cy="0"/>
+          <a:chOff x="0" y="0"/>
+          <a:chExt cx="0" cy="0"/>
+        </a:xfrm>
+      </p:grpSpPr>
+      <p:sp>
+        <p:nvSpPr>
+          <p:cNvPr id="2" name="Title 1">
+            <a:extLst>
+              <a:ext uri="{FF2B5EF4-FFF2-40B4-BE49-F238E27FC236}">
+                <a16:creationId xmlns:a16="http://schemas.microsoft.com/office/drawing/2014/main" id="{F679C53F-5B6C-4977-A824-88CD5F7EE196}"/>
+              </a:ext>
+            </a:extLst>
+          </p:cNvPr>
+          <p:cNvSpPr>
+            <a:spLocks noGrp="1"/>
+          </p:cNvSpPr>
+          <p:nvPr>
+            <p:ph type="title"/>
+          </p:nvPr>
+        </p:nvSpPr>
+        <p:spPr/>
+        <p:txBody>
+          <a:bodyPr/>
+          <a:lstStyle/>
+          <a:p>
+            <a:pPr algn="ctr"/>
+            <a:r>
+              <a:rPr lang="en-US" u="sng" dirty="0"/>
+              <a:t>Appendix</a:t>
+            </a:r>
+          </a:p>
+        </p:txBody>
+      </p:sp>
+      <p:sp>
+        <p:nvSpPr>
+          <p:cNvPr id="3" name="Text Placeholder 2">
+            <a:extLst>
+              <a:ext uri="{FF2B5EF4-FFF2-40B4-BE49-F238E27FC236}">
+                <a16:creationId xmlns:a16="http://schemas.microsoft.com/office/drawing/2014/main" id="{58D6E976-D70A-4124-A66A-5D4514ECC047}"/>
+              </a:ext>
+            </a:extLst>
+          </p:cNvPr>
+          <p:cNvSpPr>
+            <a:spLocks noGrp="1"/>
+          </p:cNvSpPr>
+          <p:nvPr>
+            <p:ph type="body" idx="1"/>
+          </p:nvPr>
+        </p:nvSpPr>
+        <p:spPr/>
+        <p:txBody>
+          <a:bodyPr/>
+          <a:lstStyle/>
+          <a:p>
+            <a:r>
+              <a:rPr lang="en-US" u="sng" dirty="0"/>
+              <a:t>Author:</a:t>
+            </a:r>
+          </a:p>
+          <a:p>
+            <a:pPr lvl="1"/>
+            <a:r>
+              <a:rPr lang="en-US" dirty="0">
+                <a:solidFill>
+                  <a:srgbClr val="202122"/>
+                </a:solidFill>
+                <a:highlight>
+                  <a:srgbClr val="FFFFFF"/>
+                </a:highlight>
+                <a:latin typeface="Arial"/>
+                <a:ea typeface="Arial"/>
+                <a:cs typeface="Arial"/>
+                <a:sym typeface="Arial"/>
+              </a:rPr>
+              <a:t>The Memento Pattern was created by Noah Thompson, David Espiritu, and Dr. Drew Clinkenbeard for early HP products. (source below) – Move to appendix</a:t>
+            </a:r>
+            <a:endParaRPr lang="en-US" dirty="0"/>
+          </a:p>
+          <a:p>
+            <a:pPr lvl="1"/>
+            <a:endParaRPr lang="en-US" dirty="0"/>
+          </a:p>
+          <a:p>
+            <a:r>
+              <a:rPr lang="en-US" u="sng" dirty="0"/>
+              <a:t>Other things of note:</a:t>
+            </a:r>
+          </a:p>
+          <a:p>
+            <a:pPr lvl="1"/>
+            <a:r>
+              <a:rPr lang="en-US" dirty="0"/>
+              <a:t>Having the memento patterns allows for branching paths via save states. (move to appendix)</a:t>
+            </a:r>
+          </a:p>
+          <a:p>
+            <a:pPr lvl="1"/>
+            <a:endParaRPr lang="en-US" u="sng" dirty="0"/>
+          </a:p>
+          <a:p>
+            <a:pPr lvl="1"/>
+            <a:endParaRPr lang="en-US" u="sng" dirty="0"/>
+          </a:p>
+          <a:p>
+            <a:endParaRPr lang="en-US" dirty="0"/>
+          </a:p>
+        </p:txBody>
+      </p:sp>
+    </p:spTree>
+    <p:extLst>
+      <p:ext uri="{BB962C8B-B14F-4D97-AF65-F5344CB8AC3E}">
+        <p14:creationId xmlns:p14="http://schemas.microsoft.com/office/powerpoint/2010/main" val="968557424"/>
+      </p:ext>
+    </p:extLst>
   </p:cSld>
   <p:clrMapOvr>
     <a:masterClrMapping/>
@@ -7653,7 +7916,7 @@
         </p:spPr>
         <p:txBody>
           <a:bodyPr spcFirstLastPara="1" wrap="square" lIns="91425" tIns="91425" rIns="91425" bIns="91425" anchor="t" anchorCtr="0">
-            <a:normAutofit lnSpcReduction="10000"/>
+            <a:normAutofit/>
           </a:bodyPr>
           <a:lstStyle/>
           <a:p>
@@ -7667,10 +7930,10 @@
               <a:buNone/>
             </a:pPr>
             <a:r>
-              <a:rPr lang="en" u="sng"/>
+              <a:rPr lang="en" u="sng" dirty="0"/>
               <a:t>The Pattern’s Purpose:</a:t>
             </a:r>
-            <a:endParaRPr u="sng"/>
+            <a:endParaRPr dirty="0"/>
           </a:p>
           <a:p>
             <a:pPr marL="457200" lvl="0" indent="-342900" algn="l" rtl="0">
@@ -7684,39 +7947,10 @@
               <a:buChar char="-"/>
             </a:pPr>
             <a:r>
-              <a:rPr lang="en"/>
-              <a:t>Like all design patterns, this one is attempting solve a common problem that occurs in software design</a:t>
+              <a:rPr lang="en" dirty="0"/>
+              <a:t>The common problem that it solves is that of creating save states for software or programs.</a:t>
             </a:r>
-            <a:endParaRPr/>
-          </a:p>
-          <a:p>
-            <a:pPr marL="457200" lvl="0" indent="0" algn="l" rtl="0">
-              <a:spcBef>
-                <a:spcPts val="1200"/>
-              </a:spcBef>
-              <a:spcAft>
-                <a:spcPts val="0"/>
-              </a:spcAft>
-              <a:buNone/>
-            </a:pPr>
-            <a:endParaRPr/>
-          </a:p>
-          <a:p>
-            <a:pPr marL="457200" lvl="0" indent="-342900" algn="l" rtl="0">
-              <a:spcBef>
-                <a:spcPts val="1200"/>
-              </a:spcBef>
-              <a:spcAft>
-                <a:spcPts val="0"/>
-              </a:spcAft>
-              <a:buSzPts val="1800"/>
-              <a:buChar char="-"/>
-            </a:pPr>
-            <a:r>
-              <a:rPr lang="en"/>
-              <a:t>The problem that it attempts to solve is that of creating save states for software or programs.</a:t>
-            </a:r>
-            <a:endParaRPr/>
+            <a:endParaRPr dirty="0"/>
           </a:p>
         </p:txBody>
       </p:sp>
@@ -7741,7 +7975,7 @@
         </p:spPr>
         <p:txBody>
           <a:bodyPr spcFirstLastPara="1" wrap="square" lIns="91425" tIns="91425" rIns="91425" bIns="91425" anchor="t" anchorCtr="0">
-            <a:normAutofit fontScale="92500" lnSpcReduction="10000"/>
+            <a:normAutofit/>
           </a:bodyPr>
           <a:lstStyle/>
           <a:p>
@@ -7755,10 +7989,10 @@
               <a:buNone/>
             </a:pPr>
             <a:r>
-              <a:rPr lang="en" u="sng"/>
-              <a:t>Other things of note:</a:t>
+              <a:rPr lang="en" u="sng" dirty="0"/>
+              <a:t>Why “Memento”:</a:t>
             </a:r>
-            <a:endParaRPr u="sng"/>
+            <a:endParaRPr u="sng" dirty="0"/>
           </a:p>
           <a:p>
             <a:pPr marL="457200" lvl="0" indent="-334327" algn="l" rtl="0">
@@ -7772,10 +8006,10 @@
               <a:buChar char="-"/>
             </a:pPr>
             <a:r>
-              <a:rPr lang="en"/>
+              <a:rPr lang="en" dirty="0"/>
               <a:t>In order to create multiple saves of a the program, it creates “memento objects” to save the internal state of the project.</a:t>
             </a:r>
-            <a:endParaRPr/>
+            <a:endParaRPr dirty="0"/>
           </a:p>
           <a:p>
             <a:pPr marL="457200" lvl="0" indent="0" algn="l" rtl="0">
@@ -7787,35 +8021,7 @@
               </a:spcAft>
               <a:buNone/>
             </a:pPr>
-            <a:endParaRPr/>
-          </a:p>
-          <a:p>
-            <a:pPr marL="457200" lvl="0" indent="-334327" algn="l" rtl="0">
-              <a:spcBef>
-                <a:spcPts val="1200"/>
-              </a:spcBef>
-              <a:spcAft>
-                <a:spcPts val="0"/>
-              </a:spcAft>
-              <a:buSzPct val="100000"/>
-              <a:buChar char="-"/>
-            </a:pPr>
-            <a:r>
-              <a:rPr lang="en">
-                <a:solidFill>
-                  <a:srgbClr val="202122"/>
-                </a:solidFill>
-                <a:highlight>
-                  <a:srgbClr val="FFFFFF"/>
-                </a:highlight>
-                <a:latin typeface="Arial"/>
-                <a:ea typeface="Arial"/>
-                <a:cs typeface="Arial"/>
-                <a:sym typeface="Arial"/>
-              </a:rPr>
-              <a:t>The Memento Pattern was created by Noah Thompson, David Espiritu, and Dr. Drew Clinkenbeard for early HP products. (source below)</a:t>
-            </a:r>
-            <a:endParaRPr/>
+            <a:endParaRPr dirty="0"/>
           </a:p>
         </p:txBody>
       </p:sp>
@@ -7828,6 +8034,123 @@
 </file>
 
 <file path=ppt/slides/slide3.xml><?xml version="1.0" encoding="utf-8"?>
+<p:sld xmlns:a="http://schemas.openxmlformats.org/drawingml/2006/main" xmlns:r="http://schemas.openxmlformats.org/officeDocument/2006/relationships" xmlns:p="http://schemas.openxmlformats.org/presentationml/2006/main">
+  <p:cSld>
+    <p:spTree>
+      <p:nvGrpSpPr>
+        <p:cNvPr id="1" name=""/>
+        <p:cNvGrpSpPr/>
+        <p:nvPr/>
+      </p:nvGrpSpPr>
+      <p:grpSpPr>
+        <a:xfrm>
+          <a:off x="0" y="0"/>
+          <a:ext cx="0" cy="0"/>
+          <a:chOff x="0" y="0"/>
+          <a:chExt cx="0" cy="0"/>
+        </a:xfrm>
+      </p:grpSpPr>
+      <p:sp>
+        <p:nvSpPr>
+          <p:cNvPr id="2" name="Title 1">
+            <a:extLst>
+              <a:ext uri="{FF2B5EF4-FFF2-40B4-BE49-F238E27FC236}">
+                <a16:creationId xmlns:a16="http://schemas.microsoft.com/office/drawing/2014/main" id="{D69E3EF5-F3D9-46FF-BAB7-296A209DD80B}"/>
+              </a:ext>
+            </a:extLst>
+          </p:cNvPr>
+          <p:cNvSpPr>
+            <a:spLocks noGrp="1"/>
+          </p:cNvSpPr>
+          <p:nvPr>
+            <p:ph type="title"/>
+          </p:nvPr>
+        </p:nvSpPr>
+        <p:spPr/>
+        <p:txBody>
+          <a:bodyPr/>
+          <a:lstStyle/>
+          <a:p>
+            <a:pPr algn="ctr"/>
+            <a:r>
+              <a:rPr lang="en-US" u="sng" dirty="0"/>
+              <a:t>Parts of the Pattern</a:t>
+            </a:r>
+          </a:p>
+        </p:txBody>
+      </p:sp>
+      <p:sp>
+        <p:nvSpPr>
+          <p:cNvPr id="3" name="Text Placeholder 2">
+            <a:extLst>
+              <a:ext uri="{FF2B5EF4-FFF2-40B4-BE49-F238E27FC236}">
+                <a16:creationId xmlns:a16="http://schemas.microsoft.com/office/drawing/2014/main" id="{77BEDA63-5E59-4A7A-A4A2-EB8705646B5D}"/>
+              </a:ext>
+            </a:extLst>
+          </p:cNvPr>
+          <p:cNvSpPr>
+            <a:spLocks noGrp="1"/>
+          </p:cNvSpPr>
+          <p:nvPr>
+            <p:ph type="body" idx="1"/>
+          </p:nvPr>
+        </p:nvSpPr>
+        <p:spPr/>
+        <p:txBody>
+          <a:bodyPr/>
+          <a:lstStyle/>
+          <a:p>
+            <a:r>
+              <a:rPr lang="en-US" dirty="0"/>
+              <a:t>Memento Class: The object that will keep the state of the originator.</a:t>
+            </a:r>
+          </a:p>
+          <a:p>
+            <a:endParaRPr lang="en-US" dirty="0"/>
+          </a:p>
+          <a:p>
+            <a:r>
+              <a:rPr lang="en-US" dirty="0"/>
+              <a:t>State Class: The current settings of the object (exists in both originator and memento classes).</a:t>
+            </a:r>
+          </a:p>
+          <a:p>
+            <a:endParaRPr lang="en-US" dirty="0"/>
+          </a:p>
+          <a:p>
+            <a:r>
+              <a:rPr lang="en-US" dirty="0"/>
+              <a:t>Caretaker Class: The class that will preform tasks on the originator.</a:t>
+            </a:r>
+          </a:p>
+          <a:p>
+            <a:endParaRPr lang="en-US" dirty="0"/>
+          </a:p>
+          <a:p>
+            <a:r>
+              <a:rPr lang="en-US" dirty="0"/>
+              <a:t>Originator Class: The object for which the state is saved.</a:t>
+            </a:r>
+          </a:p>
+          <a:p>
+            <a:endParaRPr lang="en-US" dirty="0"/>
+          </a:p>
+        </p:txBody>
+      </p:sp>
+    </p:spTree>
+    <p:extLst>
+      <p:ext uri="{BB962C8B-B14F-4D97-AF65-F5344CB8AC3E}">
+        <p14:creationId xmlns:p14="http://schemas.microsoft.com/office/powerpoint/2010/main" val="1518411619"/>
+      </p:ext>
+    </p:extLst>
+  </p:cSld>
+  <p:clrMapOvr>
+    <a:masterClrMapping/>
+  </p:clrMapOvr>
+</p:sld>
+</file>
+
+<file path=ppt/slides/slide4.xml><?xml version="1.0" encoding="utf-8"?>
 <p:sld xmlns:a="http://schemas.openxmlformats.org/drawingml/2006/main" xmlns:r="http://schemas.openxmlformats.org/officeDocument/2006/relationships" xmlns:p="http://schemas.openxmlformats.org/presentationml/2006/main">
   <p:cSld>
     <p:spTree>
@@ -7907,7 +8230,7 @@
         </p:spPr>
         <p:txBody>
           <a:bodyPr spcFirstLastPara="1" wrap="square" lIns="91425" tIns="91425" rIns="91425" bIns="91425" anchor="t" anchorCtr="0">
-            <a:normAutofit lnSpcReduction="10000"/>
+            <a:normAutofit/>
           </a:bodyPr>
           <a:lstStyle/>
           <a:p>
@@ -7921,15 +8244,15 @@
               <a:buNone/>
             </a:pPr>
             <a:r>
-              <a:rPr lang="en" u="sng"/>
+              <a:rPr lang="en" u="sng" dirty="0"/>
               <a:t>How does this pattern work?</a:t>
             </a:r>
-            <a:endParaRPr u="sng"/>
+            <a:endParaRPr u="sng" dirty="0"/>
           </a:p>
           <a:p>
             <a:pPr marL="457200" lvl="0" indent="-342900" algn="l" rtl="0">
               <a:spcBef>
-                <a:spcPts val="1200"/>
+                <a:spcPts val="0"/>
               </a:spcBef>
               <a:spcAft>
                 <a:spcPts val="0"/>
@@ -7938,10 +8261,22 @@
               <a:buChar char="-"/>
             </a:pPr>
             <a:r>
-              <a:rPr lang="en"/>
-              <a:t>The memento pattern’s structure contains  a memento, a caretaker, a originator, and a state class.</a:t>
+              <a:rPr lang="en" b="1" dirty="0"/>
+              <a:t>Main class is the caretaker (handles “save states”)</a:t>
             </a:r>
-            <a:endParaRPr/>
+          </a:p>
+          <a:p>
+            <a:pPr marL="114300" lvl="0" indent="0" algn="l" rtl="0">
+              <a:spcBef>
+                <a:spcPts val="0"/>
+              </a:spcBef>
+              <a:spcAft>
+                <a:spcPts val="0"/>
+              </a:spcAft>
+              <a:buSzPts val="1800"/>
+              <a:buNone/>
+            </a:pPr>
+            <a:endParaRPr lang="en" dirty="0"/>
           </a:p>
           <a:p>
             <a:pPr marL="457200" lvl="0" indent="-342900" algn="l" rtl="0">
@@ -7955,10 +8290,22 @@
               <a:buChar char="-"/>
             </a:pPr>
             <a:r>
-              <a:rPr lang="en"/>
-              <a:t>Main class is the caretaker (handles “save states”)</a:t>
+              <a:rPr lang="en" dirty="0"/>
+              <a:t>Caretaker class the methods of the other classes.</a:t>
             </a:r>
-            <a:endParaRPr/>
+          </a:p>
+          <a:p>
+            <a:pPr marL="114300" lvl="0" indent="0" algn="l" rtl="0">
+              <a:spcBef>
+                <a:spcPts val="0"/>
+              </a:spcBef>
+              <a:spcAft>
+                <a:spcPts val="0"/>
+              </a:spcAft>
+              <a:buSzPts val="1800"/>
+              <a:buNone/>
+            </a:pPr>
+            <a:endParaRPr lang="en" dirty="0"/>
           </a:p>
           <a:p>
             <a:pPr marL="457200" lvl="0" indent="-342900" algn="l" rtl="0">
@@ -7972,73 +8319,40 @@
               <a:buChar char="-"/>
             </a:pPr>
             <a:r>
-              <a:rPr lang="en"/>
-              <a:t>Memento class can be an interface</a:t>
+              <a:rPr lang="en" dirty="0"/>
+              <a:t>Can have additional classes to modify the memento objects.</a:t>
             </a:r>
-            <a:endParaRPr/>
-          </a:p>
-          <a:p>
-            <a:pPr marL="457200" lvl="0" indent="-342900" algn="l" rtl="0">
-              <a:spcBef>
-                <a:spcPts val="0"/>
-              </a:spcBef>
-              <a:spcAft>
-                <a:spcPts val="0"/>
-              </a:spcAft>
-              <a:buSzPts val="1800"/>
-              <a:buChar char="-"/>
-            </a:pPr>
-            <a:r>
-              <a:rPr lang="en"/>
-              <a:t>Originator creates memento</a:t>
-            </a:r>
-            <a:endParaRPr/>
-          </a:p>
-          <a:p>
-            <a:pPr marL="457200" lvl="0" indent="-342900" algn="l" rtl="0">
-              <a:spcBef>
-                <a:spcPts val="0"/>
-              </a:spcBef>
-              <a:spcAft>
-                <a:spcPts val="0"/>
-              </a:spcAft>
-              <a:buSzPts val="1800"/>
-              <a:buChar char="-"/>
-            </a:pPr>
-            <a:r>
-              <a:rPr lang="en"/>
-              <a:t>State is in both originator and memento</a:t>
-            </a:r>
-            <a:endParaRPr/>
           </a:p>
         </p:txBody>
       </p:sp>
       <p:pic>
         <p:nvPicPr>
-          <p:cNvPr id="78" name="Google Shape;78;p15"/>
-          <p:cNvPicPr preferRelativeResize="0"/>
+          <p:cNvPr id="3" name="Picture 2" descr="Diagram&#10;&#10;Description automatically generated">
+            <a:extLst>
+              <a:ext uri="{FF2B5EF4-FFF2-40B4-BE49-F238E27FC236}">
+                <a16:creationId xmlns:a16="http://schemas.microsoft.com/office/drawing/2014/main" id="{423C08B1-2467-4436-9F97-A9E1ACA5E51D}"/>
+              </a:ext>
+            </a:extLst>
+          </p:cNvPr>
+          <p:cNvPicPr>
+            <a:picLocks noChangeAspect="1"/>
+          </p:cNvPicPr>
           <p:nvPr/>
         </p:nvPicPr>
         <p:blipFill>
-          <a:blip r:embed="rId3">
-            <a:alphaModFix/>
-          </a:blip>
+          <a:blip r:embed="rId3"/>
           <a:stretch>
             <a:fillRect/>
           </a:stretch>
         </p:blipFill>
         <p:spPr>
           <a:xfrm>
-            <a:off x="4787000" y="1291600"/>
-            <a:ext cx="4267197" cy="3221234"/>
+            <a:off x="4364158" y="1147225"/>
+            <a:ext cx="4468142" cy="3401319"/>
           </a:xfrm>
           <a:prstGeom prst="rect">
             <a:avLst/>
           </a:prstGeom>
-          <a:noFill/>
-          <a:ln>
-            <a:noFill/>
-          </a:ln>
         </p:spPr>
       </p:pic>
     </p:spTree>
@@ -8049,7 +8363,7 @@
 </p:sld>
 </file>
 
-<file path=ppt/slides/slide4.xml><?xml version="1.0" encoding="utf-8"?>
+<file path=ppt/slides/slide5.xml><?xml version="1.0" encoding="utf-8"?>
 <p:sld xmlns:a="http://schemas.openxmlformats.org/drawingml/2006/main" xmlns:r="http://schemas.openxmlformats.org/officeDocument/2006/relationships" xmlns:p="http://schemas.openxmlformats.org/presentationml/2006/main">
   <p:cSld>
     <p:spTree>
@@ -8143,10 +8457,10 @@
               <a:buNone/>
             </a:pPr>
             <a:r>
-              <a:rPr lang="en" u="sng"/>
+              <a:rPr lang="en" u="sng" dirty="0"/>
               <a:t>Problems they address and solve:</a:t>
             </a:r>
-            <a:endParaRPr u="sng"/>
+            <a:endParaRPr u="sng" dirty="0"/>
           </a:p>
           <a:p>
             <a:pPr marL="457200" lvl="0" indent="-342900" algn="l" rtl="0">
@@ -8160,10 +8474,10 @@
               <a:buChar char="-"/>
             </a:pPr>
             <a:r>
-              <a:rPr lang="en"/>
-              <a:t>Can be used for “roll backs” to a previous state</a:t>
+              <a:rPr lang="en" u="sng" dirty="0"/>
+              <a:t>Can be used for “roll backs” to a previous state:</a:t>
             </a:r>
-            <a:endParaRPr/>
+            <a:endParaRPr u="sng" dirty="0"/>
           </a:p>
           <a:p>
             <a:pPr marL="914400" lvl="1" indent="-342900" algn="l" rtl="0">
@@ -8177,10 +8491,10 @@
               <a:buChar char="-"/>
             </a:pPr>
             <a:r>
-              <a:rPr lang="en" sz="1800"/>
+              <a:rPr lang="en" sz="1800" dirty="0"/>
               <a:t>An example of this would be “roll back” connection for fighting games.</a:t>
             </a:r>
-            <a:endParaRPr sz="1800"/>
+            <a:endParaRPr sz="1800" dirty="0"/>
           </a:p>
           <a:p>
             <a:pPr marL="914400" lvl="1" indent="-342900" algn="l" rtl="0">
@@ -8194,10 +8508,10 @@
               <a:buChar char="-"/>
             </a:pPr>
             <a:r>
-              <a:rPr lang="en" sz="1800"/>
+              <a:rPr lang="en" sz="1800" dirty="0"/>
               <a:t>Another example would be quick saving and loading in a game.</a:t>
             </a:r>
-            <a:endParaRPr sz="1800"/>
+            <a:endParaRPr sz="1800" dirty="0"/>
           </a:p>
           <a:p>
             <a:pPr marL="914400" lvl="0" indent="0" algn="l" rtl="0">
@@ -8209,7 +8523,7 @@
               </a:spcAft>
               <a:buNone/>
             </a:pPr>
-            <a:endParaRPr sz="1800"/>
+            <a:endParaRPr sz="1800" dirty="0"/>
           </a:p>
           <a:p>
             <a:pPr marL="457200" lvl="0" indent="-342900" algn="l" rtl="0">
@@ -8223,10 +8537,10 @@
               <a:buChar char="-"/>
             </a:pPr>
             <a:r>
-              <a:rPr lang="en"/>
-              <a:t>It can be used to save the internal state of something externally</a:t>
+              <a:rPr lang="en" u="sng" dirty="0"/>
+              <a:t>It can be used to save the internal state of something externally:</a:t>
             </a:r>
-            <a:endParaRPr/>
+            <a:endParaRPr u="sng" dirty="0"/>
           </a:p>
           <a:p>
             <a:pPr marL="914400" lvl="1" indent="-342900" algn="l" rtl="0">
@@ -8240,10 +8554,10 @@
               <a:buChar char="-"/>
             </a:pPr>
             <a:r>
-              <a:rPr lang="en" sz="1800"/>
+              <a:rPr lang="en" sz="1800" dirty="0"/>
               <a:t>Like having a repo of updates for a program.</a:t>
             </a:r>
-            <a:endParaRPr sz="1800"/>
+            <a:endParaRPr sz="1800" dirty="0"/>
           </a:p>
           <a:p>
             <a:pPr marL="914400" lvl="1" indent="-342900" algn="l" rtl="0">
@@ -8257,10 +8571,10 @@
               <a:buChar char="-"/>
             </a:pPr>
             <a:r>
-              <a:rPr lang="en" sz="1800"/>
+              <a:rPr lang="en" sz="1800" dirty="0"/>
               <a:t>Or how you can create multiple saves of a game or edits of a picture.</a:t>
             </a:r>
-            <a:endParaRPr sz="1800"/>
+            <a:endParaRPr sz="1800" dirty="0"/>
           </a:p>
         </p:txBody>
       </p:sp>
@@ -8272,7 +8586,7 @@
 </p:sld>
 </file>
 
-<file path=ppt/slides/slide5.xml><?xml version="1.0" encoding="utf-8"?>
+<file path=ppt/slides/slide6.xml><?xml version="1.0" encoding="utf-8"?>
 <p:sld xmlns:a="http://schemas.openxmlformats.org/drawingml/2006/main" xmlns:r="http://schemas.openxmlformats.org/officeDocument/2006/relationships" xmlns:p="http://schemas.openxmlformats.org/presentationml/2006/main">
   <p:cSld>
     <p:spTree>
@@ -8339,27 +8653,16 @@
           <a:bodyPr/>
           <a:lstStyle/>
           <a:p>
+            <a:endParaRPr lang="en-US" dirty="0"/>
+          </a:p>
+          <a:p>
+            <a:endParaRPr lang="en-US" dirty="0"/>
+          </a:p>
+          <a:p>
             <a:r>
-              <a:rPr lang="en-US" dirty="0"/>
-              <a:t>You don’t have direct access to the states in a simple list.</a:t>
+              <a:rPr lang="en-US" sz="2400" dirty="0"/>
+              <a:t>You don’t have direct access to the states in a simple list (pattern allows for access through the caretaker class).</a:t>
             </a:r>
-          </a:p>
-          <a:p>
-            <a:r>
-              <a:rPr lang="en-US" dirty="0"/>
-              <a:t>You miss the ability to interact with the specific save states.</a:t>
-            </a:r>
-          </a:p>
-          <a:p>
-            <a:r>
-              <a:rPr lang="en-US" dirty="0"/>
-              <a:t>Having the memento patterns allows for branching paths via </a:t>
-            </a:r>
-            <a:r>
-              <a:rPr lang="en-US"/>
-              <a:t>save states.</a:t>
-            </a:r>
-            <a:endParaRPr lang="en-US" dirty="0"/>
           </a:p>
         </p:txBody>
       </p:sp>
@@ -8376,7 +8679,7 @@
 </p:sld>
 </file>
 
-<file path=ppt/slides/slide6.xml><?xml version="1.0" encoding="utf-8"?>
+<file path=ppt/slides/slide7.xml><?xml version="1.0" encoding="utf-8"?>
 <p:sld xmlns:a="http://schemas.openxmlformats.org/drawingml/2006/main" xmlns:r="http://schemas.openxmlformats.org/officeDocument/2006/relationships" xmlns:p="http://schemas.openxmlformats.org/presentationml/2006/main">
   <p:cSld>
     <p:spTree>
@@ -8471,7 +8774,7 @@
 </p:sld>
 </file>
 
-<file path=ppt/slides/slide7.xml><?xml version="1.0" encoding="utf-8"?>
+<file path=ppt/slides/slide8.xml><?xml version="1.0" encoding="utf-8"?>
 <p:sld xmlns:a="http://schemas.openxmlformats.org/drawingml/2006/main" xmlns:r="http://schemas.openxmlformats.org/officeDocument/2006/relationships" xmlns:p="http://schemas.openxmlformats.org/presentationml/2006/main">
   <p:cSld>
     <p:spTree>
@@ -8551,7 +8854,7 @@
         </p:spPr>
         <p:txBody>
           <a:bodyPr spcFirstLastPara="1" wrap="square" lIns="91425" tIns="91425" rIns="91425" bIns="91425" anchor="t" anchorCtr="0">
-            <a:normAutofit/>
+            <a:normAutofit fontScale="47500" lnSpcReduction="20000"/>
           </a:bodyPr>
           <a:lstStyle/>
           <a:p>
@@ -8580,7 +8883,7 @@
 </p:sld>
 </file>
 
-<file path=ppt/slides/slide8.xml><?xml version="1.0" encoding="utf-8"?>
+<file path=ppt/slides/slide9.xml><?xml version="1.0" encoding="utf-8"?>
 <p:sld xmlns:a="http://schemas.openxmlformats.org/drawingml/2006/main" xmlns:r="http://schemas.openxmlformats.org/officeDocument/2006/relationships" xmlns:p="http://schemas.openxmlformats.org/presentationml/2006/main">
   <p:cSld>
     <p:spTree>
@@ -8854,133 +9157,6 @@
               <a:cs typeface="Open Sans"/>
               <a:sym typeface="Open Sans"/>
             </a:endParaRPr>
-          </a:p>
-        </p:txBody>
-      </p:sp>
-    </p:spTree>
-  </p:cSld>
-  <p:clrMapOvr>
-    <a:masterClrMapping/>
-  </p:clrMapOvr>
-</p:sld>
-</file>
-
-<file path=ppt/slides/slide9.xml><?xml version="1.0" encoding="utf-8"?>
-<p:sld xmlns:a="http://schemas.openxmlformats.org/drawingml/2006/main" xmlns:r="http://schemas.openxmlformats.org/officeDocument/2006/relationships" xmlns:p="http://schemas.openxmlformats.org/presentationml/2006/main">
-  <p:cSld>
-    <p:spTree>
-      <p:nvGrpSpPr>
-        <p:cNvPr id="1" name="Shape 107"/>
-        <p:cNvGrpSpPr/>
-        <p:nvPr/>
-      </p:nvGrpSpPr>
-      <p:grpSpPr>
-        <a:xfrm>
-          <a:off x="0" y="0"/>
-          <a:ext cx="0" cy="0"/>
-          <a:chOff x="0" y="0"/>
-          <a:chExt cx="0" cy="0"/>
-        </a:xfrm>
-      </p:grpSpPr>
-      <p:sp>
-        <p:nvSpPr>
-          <p:cNvPr id="108" name="Google Shape;108;p20"/>
-          <p:cNvSpPr txBox="1">
-            <a:spLocks noGrp="1"/>
-          </p:cNvSpPr>
-          <p:nvPr>
-            <p:ph type="title"/>
-          </p:nvPr>
-        </p:nvSpPr>
-        <p:spPr>
-          <a:xfrm>
-            <a:off x="311700" y="315925"/>
-            <a:ext cx="8520600" cy="831300"/>
-          </a:xfrm>
-          <a:prstGeom prst="rect">
-            <a:avLst/>
-          </a:prstGeom>
-        </p:spPr>
-        <p:txBody>
-          <a:bodyPr spcFirstLastPara="1" wrap="square" lIns="91425" tIns="91425" rIns="91425" bIns="91425" anchor="b" anchorCtr="0">
-            <a:normAutofit/>
-          </a:bodyPr>
-          <a:lstStyle/>
-          <a:p>
-            <a:pPr marL="0" lvl="0" indent="0" algn="ctr" rtl="0">
-              <a:spcBef>
-                <a:spcPts val="0"/>
-              </a:spcBef>
-              <a:spcAft>
-                <a:spcPts val="0"/>
-              </a:spcAft>
-              <a:buNone/>
-            </a:pPr>
-            <a:r>
-              <a:rPr lang="en" u="sng"/>
-              <a:t>Memento pattern conclusion (and summary):</a:t>
-            </a:r>
-            <a:endParaRPr u="sng"/>
-          </a:p>
-        </p:txBody>
-      </p:sp>
-      <p:sp>
-        <p:nvSpPr>
-          <p:cNvPr id="109" name="Google Shape;109;p20"/>
-          <p:cNvSpPr txBox="1">
-            <a:spLocks noGrp="1"/>
-          </p:cNvSpPr>
-          <p:nvPr>
-            <p:ph type="body" idx="1"/>
-          </p:nvPr>
-        </p:nvSpPr>
-        <p:spPr>
-          <a:xfrm>
-            <a:off x="311700" y="1225225"/>
-            <a:ext cx="8520600" cy="3354000"/>
-          </a:xfrm>
-          <a:prstGeom prst="rect">
-            <a:avLst/>
-          </a:prstGeom>
-        </p:spPr>
-        <p:txBody>
-          <a:bodyPr spcFirstLastPara="1" wrap="square" lIns="91425" tIns="91425" rIns="91425" bIns="91425" anchor="t" anchorCtr="0">
-            <a:normAutofit/>
-          </a:bodyPr>
-          <a:lstStyle/>
-          <a:p>
-            <a:pPr marL="457200" lvl="0" indent="-342900" algn="l" rtl="0">
-              <a:spcBef>
-                <a:spcPts val="0"/>
-              </a:spcBef>
-              <a:spcAft>
-                <a:spcPts val="0"/>
-              </a:spcAft>
-              <a:buSzPts val="1800"/>
-              <a:buChar char="●"/>
-            </a:pPr>
-            <a:r>
-              <a:rPr lang="en"/>
-              <a:t>You can use the memento pattern to save and restore various states of an object</a:t>
-            </a:r>
-            <a:endParaRPr/>
-          </a:p>
-          <a:p>
-            <a:pPr marL="457200" lvl="0" indent="-342900" algn="l" rtl="0">
-              <a:spcBef>
-                <a:spcPts val="0"/>
-              </a:spcBef>
-              <a:spcAft>
-                <a:spcPts val="0"/>
-              </a:spcAft>
-              <a:buSzPts val="1800"/>
-              <a:buChar char="●"/>
-            </a:pPr>
-            <a:r>
-              <a:rPr lang="en"/>
-              <a:t>The basis of rolling back states</a:t>
-            </a:r>
-            <a:endParaRPr/>
           </a:p>
         </p:txBody>
       </p:sp>

</xml_diff>

<commit_message>
Updated Presentation to include new UML diagram
</commit_message>
<xml_diff>
--- a/SE 2811-031 Section 031.pptx
+++ b/SE 2811-031 Section 031.pptx
@@ -1479,7 +1479,7 @@
         </p:nvSpPr>
         <p:spPr>
           <a:xfrm>
-            <a:off x="381300" y="685800"/>
+            <a:off x="381000" y="685800"/>
             <a:ext cx="6096000" cy="3429000"/>
           </a:xfrm>
           <a:custGeom>
@@ -8740,30 +8740,32 @@
       </p:sp>
       <p:pic>
         <p:nvPicPr>
-          <p:cNvPr id="90" name="Google Shape;90;p17"/>
-          <p:cNvPicPr preferRelativeResize="0"/>
+          <p:cNvPr id="3" name="Picture 2">
+            <a:extLst>
+              <a:ext uri="{FF2B5EF4-FFF2-40B4-BE49-F238E27FC236}">
+                <a16:creationId xmlns:a16="http://schemas.microsoft.com/office/drawing/2014/main" id="{B32A2FF7-3625-4C4F-8D05-2FA56C089A78}"/>
+              </a:ext>
+            </a:extLst>
+          </p:cNvPr>
+          <p:cNvPicPr>
+            <a:picLocks noChangeAspect="1"/>
+          </p:cNvPicPr>
           <p:nvPr/>
         </p:nvPicPr>
         <p:blipFill>
-          <a:blip r:embed="rId3">
-            <a:alphaModFix/>
-          </a:blip>
+          <a:blip r:embed="rId3"/>
           <a:stretch>
             <a:fillRect/>
           </a:stretch>
         </p:blipFill>
         <p:spPr>
           <a:xfrm>
-            <a:off x="2152650" y="1662113"/>
-            <a:ext cx="4838700" cy="1819275"/>
+            <a:off x="800100" y="1547812"/>
+            <a:ext cx="7543800" cy="2047875"/>
           </a:xfrm>
           <a:prstGeom prst="rect">
             <a:avLst/>
           </a:prstGeom>
-          <a:noFill/>
-          <a:ln>
-            <a:noFill/>
-          </a:ln>
         </p:spPr>
       </p:pic>
     </p:spTree>

</xml_diff>